<commit_message>
add HyPer: Data Blocks
</commit_message>
<xml_diff>
--- a/Vectorization/ROVEC/ROVEC.pptx
+++ b/Vectorization/ROVEC/ROVEC.pptx
@@ -5,7 +5,7 @@
     <p:sldMasterId id="2147483648" r:id="rId1"/>
   </p:sldMasterIdLst>
   <p:notesMasterIdLst>
-    <p:notesMasterId r:id="rId9"/>
+    <p:notesMasterId r:id="rId10"/>
   </p:notesMasterIdLst>
   <p:sldIdLst>
     <p:sldId id="256" r:id="rId2"/>
@@ -14,7 +14,8 @@
     <p:sldId id="259" r:id="rId5"/>
     <p:sldId id="261" r:id="rId6"/>
     <p:sldId id="260" r:id="rId7"/>
-    <p:sldId id="262" r:id="rId8"/>
+    <p:sldId id="263" r:id="rId8"/>
+    <p:sldId id="262" r:id="rId9"/>
   </p:sldIdLst>
   <p:sldSz cx="12192000" cy="6858000"/>
   <p:notesSz cx="6858000" cy="9144000"/>
@@ -113,6 +114,11 @@
       </a:defRPr>
     </a:lvl9pPr>
   </p:defaultTextStyle>
+  <p:extLst>
+    <p:ext uri="{EFAFB233-063F-42B5-8137-9DF3F51BA10A}">
+      <p15:sldGuideLst xmlns:p15="http://schemas.microsoft.com/office/powerpoint/2012/main"/>
+    </p:ext>
+  </p:extLst>
 </p:presentation>
 </file>
 
@@ -198,7 +204,7 @@
           <a:p>
             <a:fld id="{7ED18465-F3E3-4068-870E-A15265C3236D}" type="datetimeFigureOut">
               <a:rPr lang="zh-CN" altLang="en-US" smtClean="0"/>
-              <a:t>2022/7/7</a:t>
+              <a:t>2022/7/14</a:t>
             </a:fld>
             <a:endParaRPr lang="zh-CN" altLang="en-US"/>
           </a:p>
@@ -640,7 +646,7 @@
                 <a:effectLst/>
                 <a:latin typeface="Open Sans" panose="020B0604020202020204" pitchFamily="34" charset="0"/>
               </a:rPr>
-              <a:t>一般是指数据库操作中的断言</a:t>
+              <a:t>一般是指数据库操作中的谓词</a:t>
             </a:r>
             <a:r>
               <a:rPr lang="en-US" altLang="zh-CN" b="0" i="0" dirty="0">
@@ -1172,7 +1178,7 @@
             </a:r>
             <a:r>
               <a:rPr lang="zh-CN" altLang="en-US" dirty="0"/>
-              <a:t>）常数折叠</a:t>
+              <a:t>）常数折叠，因为上一步把压缩数据展开为子表达式，因此可能会出现常数。</a:t>
             </a:r>
             <a:endParaRPr lang="en-US" altLang="zh-CN" dirty="0"/>
           </a:p>
@@ -1845,7 +1851,7 @@
           <a:p>
             <a:fld id="{BE9903AD-BD0C-4FC6-8BCF-53BC05F307B0}" type="datetimeFigureOut">
               <a:rPr lang="zh-CN" altLang="en-US" smtClean="0"/>
-              <a:t>2022/7/7</a:t>
+              <a:t>2022/7/14</a:t>
             </a:fld>
             <a:endParaRPr lang="zh-CN" altLang="en-US"/>
           </a:p>
@@ -2043,7 +2049,7 @@
           <a:p>
             <a:fld id="{BE9903AD-BD0C-4FC6-8BCF-53BC05F307B0}" type="datetimeFigureOut">
               <a:rPr lang="zh-CN" altLang="en-US" smtClean="0"/>
-              <a:t>2022/7/7</a:t>
+              <a:t>2022/7/14</a:t>
             </a:fld>
             <a:endParaRPr lang="zh-CN" altLang="en-US"/>
           </a:p>
@@ -2251,7 +2257,7 @@
           <a:p>
             <a:fld id="{BE9903AD-BD0C-4FC6-8BCF-53BC05F307B0}" type="datetimeFigureOut">
               <a:rPr lang="zh-CN" altLang="en-US" smtClean="0"/>
-              <a:t>2022/7/7</a:t>
+              <a:t>2022/7/14</a:t>
             </a:fld>
             <a:endParaRPr lang="zh-CN" altLang="en-US"/>
           </a:p>
@@ -2449,7 +2455,7 @@
           <a:p>
             <a:fld id="{BE9903AD-BD0C-4FC6-8BCF-53BC05F307B0}" type="datetimeFigureOut">
               <a:rPr lang="zh-CN" altLang="en-US" smtClean="0"/>
-              <a:t>2022/7/7</a:t>
+              <a:t>2022/7/14</a:t>
             </a:fld>
             <a:endParaRPr lang="zh-CN" altLang="en-US"/>
           </a:p>
@@ -2724,7 +2730,7 @@
           <a:p>
             <a:fld id="{BE9903AD-BD0C-4FC6-8BCF-53BC05F307B0}" type="datetimeFigureOut">
               <a:rPr lang="zh-CN" altLang="en-US" smtClean="0"/>
-              <a:t>2022/7/7</a:t>
+              <a:t>2022/7/14</a:t>
             </a:fld>
             <a:endParaRPr lang="zh-CN" altLang="en-US"/>
           </a:p>
@@ -2989,7 +2995,7 @@
           <a:p>
             <a:fld id="{BE9903AD-BD0C-4FC6-8BCF-53BC05F307B0}" type="datetimeFigureOut">
               <a:rPr lang="zh-CN" altLang="en-US" smtClean="0"/>
-              <a:t>2022/7/7</a:t>
+              <a:t>2022/7/14</a:t>
             </a:fld>
             <a:endParaRPr lang="zh-CN" altLang="en-US"/>
           </a:p>
@@ -3401,7 +3407,7 @@
           <a:p>
             <a:fld id="{BE9903AD-BD0C-4FC6-8BCF-53BC05F307B0}" type="datetimeFigureOut">
               <a:rPr lang="zh-CN" altLang="en-US" smtClean="0"/>
-              <a:t>2022/7/7</a:t>
+              <a:t>2022/7/14</a:t>
             </a:fld>
             <a:endParaRPr lang="zh-CN" altLang="en-US"/>
           </a:p>
@@ -3542,7 +3548,7 @@
           <a:p>
             <a:fld id="{BE9903AD-BD0C-4FC6-8BCF-53BC05F307B0}" type="datetimeFigureOut">
               <a:rPr lang="zh-CN" altLang="en-US" smtClean="0"/>
-              <a:t>2022/7/7</a:t>
+              <a:t>2022/7/14</a:t>
             </a:fld>
             <a:endParaRPr lang="zh-CN" altLang="en-US"/>
           </a:p>
@@ -3655,7 +3661,7 @@
           <a:p>
             <a:fld id="{BE9903AD-BD0C-4FC6-8BCF-53BC05F307B0}" type="datetimeFigureOut">
               <a:rPr lang="zh-CN" altLang="en-US" smtClean="0"/>
-              <a:t>2022/7/7</a:t>
+              <a:t>2022/7/14</a:t>
             </a:fld>
             <a:endParaRPr lang="zh-CN" altLang="en-US"/>
           </a:p>
@@ -3966,7 +3972,7 @@
           <a:p>
             <a:fld id="{BE9903AD-BD0C-4FC6-8BCF-53BC05F307B0}" type="datetimeFigureOut">
               <a:rPr lang="zh-CN" altLang="en-US" smtClean="0"/>
-              <a:t>2022/7/7</a:t>
+              <a:t>2022/7/14</a:t>
             </a:fld>
             <a:endParaRPr lang="zh-CN" altLang="en-US"/>
           </a:p>
@@ -4254,7 +4260,7 @@
           <a:p>
             <a:fld id="{BE9903AD-BD0C-4FC6-8BCF-53BC05F307B0}" type="datetimeFigureOut">
               <a:rPr lang="zh-CN" altLang="en-US" smtClean="0"/>
-              <a:t>2022/7/7</a:t>
+              <a:t>2022/7/14</a:t>
             </a:fld>
             <a:endParaRPr lang="zh-CN" altLang="en-US"/>
           </a:p>
@@ -4495,7 +4501,7 @@
           <a:p>
             <a:fld id="{BE9903AD-BD0C-4FC6-8BCF-53BC05F307B0}" type="datetimeFigureOut">
               <a:rPr lang="zh-CN" altLang="en-US" smtClean="0"/>
-              <a:t>2022/7/7</a:t>
+              <a:t>2022/7/14</a:t>
             </a:fld>
             <a:endParaRPr lang="zh-CN" altLang="en-US"/>
           </a:p>
@@ -5626,8 +5632,8 @@
           </a:p>
         </p:txBody>
       </p:sp>
-      <mc:AlternateContent xmlns:mc="http://schemas.openxmlformats.org/markup-compatibility/2006">
-        <mc:Choice xmlns:a14="http://schemas.microsoft.com/office/drawing/2010/main" Requires="a14">
+      <mc:AlternateContent xmlns:mc="http://schemas.openxmlformats.org/markup-compatibility/2006" xmlns:a14="http://schemas.microsoft.com/office/drawing/2010/main">
+        <mc:Choice Requires="a14">
           <p:sp>
             <p:nvSpPr>
               <p:cNvPr id="2" name="文本框 1">
@@ -5656,6 +5662,7 @@
               </a:bodyPr>
               <a:lstStyle/>
               <a:p>
+                <a:pPr/>
                 <a14:m>
                   <m:oMathPara xmlns:m="http://schemas.openxmlformats.org/officeDocument/2006/math">
                     <m:oMathParaPr>
@@ -5726,7 +5733,7 @@
             </p:txBody>
           </p:sp>
         </mc:Choice>
-        <mc:Fallback>
+        <mc:Fallback xmlns="">
           <p:sp>
             <p:nvSpPr>
               <p:cNvPr id="2" name="文本框 1">
@@ -5810,8 +5817,8 @@
           </a:p>
         </p:txBody>
       </p:sp>
-      <mc:AlternateContent xmlns:mc="http://schemas.openxmlformats.org/markup-compatibility/2006">
-        <mc:Choice xmlns:a14="http://schemas.microsoft.com/office/drawing/2010/main" Requires="a14">
+      <mc:AlternateContent xmlns:mc="http://schemas.openxmlformats.org/markup-compatibility/2006" xmlns:a14="http://schemas.microsoft.com/office/drawing/2010/main">
+        <mc:Choice Requires="a14">
           <p:sp>
             <p:nvSpPr>
               <p:cNvPr id="3" name="文本框 2">
@@ -5840,6 +5847,7 @@
               </a:bodyPr>
               <a:lstStyle/>
               <a:p>
+                <a:pPr/>
                 <a14:m>
                   <m:oMathPara xmlns:m="http://schemas.openxmlformats.org/officeDocument/2006/math">
                     <m:oMathParaPr>
@@ -5866,7 +5874,7 @@
             </p:txBody>
           </p:sp>
         </mc:Choice>
-        <mc:Fallback>
+        <mc:Fallback xmlns="">
           <p:sp>
             <p:nvSpPr>
               <p:cNvPr id="3" name="文本框 2">
@@ -5965,8 +5973,8 @@
           </a:p>
         </p:txBody>
       </p:sp>
-      <mc:AlternateContent xmlns:mc="http://schemas.openxmlformats.org/markup-compatibility/2006">
-        <mc:Choice xmlns:a14="http://schemas.microsoft.com/office/drawing/2010/main" Requires="a14">
+      <mc:AlternateContent xmlns:mc="http://schemas.openxmlformats.org/markup-compatibility/2006" xmlns:a14="http://schemas.microsoft.com/office/drawing/2010/main">
+        <mc:Choice Requires="a14">
           <p:sp>
             <p:nvSpPr>
               <p:cNvPr id="12" name="文本框 11">
@@ -5995,6 +6003,7 @@
               </a:bodyPr>
               <a:lstStyle/>
               <a:p>
+                <a:pPr/>
                 <a14:m>
                   <m:oMathPara xmlns:m="http://schemas.openxmlformats.org/officeDocument/2006/math">
                     <m:oMathParaPr>
@@ -6021,7 +6030,7 @@
             </p:txBody>
           </p:sp>
         </mc:Choice>
-        <mc:Fallback>
+        <mc:Fallback xmlns="">
           <p:sp>
             <p:nvSpPr>
               <p:cNvPr id="12" name="文本框 11">
@@ -6856,6 +6865,179 @@
 </file>
 
 <file path=ppt/slides/slide7.xml><?xml version="1.0" encoding="utf-8"?>
+<p:sld xmlns:a="http://schemas.openxmlformats.org/drawingml/2006/main" xmlns:r="http://schemas.openxmlformats.org/officeDocument/2006/relationships" xmlns:p="http://schemas.openxmlformats.org/presentationml/2006/main">
+  <p:cSld>
+    <p:spTree>
+      <p:nvGrpSpPr>
+        <p:cNvPr id="1" name=""/>
+        <p:cNvGrpSpPr/>
+        <p:nvPr/>
+      </p:nvGrpSpPr>
+      <p:grpSpPr>
+        <a:xfrm>
+          <a:off x="0" y="0"/>
+          <a:ext cx="0" cy="0"/>
+          <a:chOff x="0" y="0"/>
+          <a:chExt cx="0" cy="0"/>
+        </a:xfrm>
+      </p:grpSpPr>
+      <p:sp>
+        <p:nvSpPr>
+          <p:cNvPr id="4" name="文本框 3">
+            <a:extLst>
+              <a:ext uri="{FF2B5EF4-FFF2-40B4-BE49-F238E27FC236}">
+                <a16:creationId xmlns:a16="http://schemas.microsoft.com/office/drawing/2014/main" id="{A74266F6-48DA-0900-1FB0-AB6AE6D2CDE6}"/>
+              </a:ext>
+            </a:extLst>
+          </p:cNvPr>
+          <p:cNvSpPr txBox="1"/>
+          <p:nvPr/>
+        </p:nvSpPr>
+        <p:spPr>
+          <a:xfrm>
+            <a:off x="447149" y="355169"/>
+            <a:ext cx="1788051" cy="461665"/>
+          </a:xfrm>
+          <a:prstGeom prst="rect">
+            <a:avLst/>
+          </a:prstGeom>
+          <a:noFill/>
+        </p:spPr>
+        <p:txBody>
+          <a:bodyPr wrap="square" rtlCol="0">
+            <a:spAutoFit/>
+          </a:bodyPr>
+          <a:lstStyle/>
+          <a:p>
+            <a:pPr algn="ctr"/>
+            <a:r>
+              <a:rPr lang="en-US" altLang="zh-CN" sz="2400" b="1" dirty="0">
+                <a:latin typeface="微软雅黑" panose="020B0503020204020204" pitchFamily="34" charset="-122"/>
+                <a:ea typeface="微软雅黑" panose="020B0503020204020204" pitchFamily="34" charset="-122"/>
+              </a:rPr>
+              <a:t>Question</a:t>
+            </a:r>
+            <a:endParaRPr lang="zh-CN" altLang="en-US" sz="2400" b="1" dirty="0">
+              <a:latin typeface="微软雅黑" panose="020B0503020204020204" pitchFamily="34" charset="-122"/>
+              <a:ea typeface="微软雅黑" panose="020B0503020204020204" pitchFamily="34" charset="-122"/>
+            </a:endParaRPr>
+          </a:p>
+        </p:txBody>
+      </p:sp>
+      <p:sp>
+        <p:nvSpPr>
+          <p:cNvPr id="6" name="文本框 5">
+            <a:extLst>
+              <a:ext uri="{FF2B5EF4-FFF2-40B4-BE49-F238E27FC236}">
+                <a16:creationId xmlns:a16="http://schemas.microsoft.com/office/drawing/2014/main" id="{80C99EAE-F322-8EC6-3AB2-1D52F1DAB810}"/>
+              </a:ext>
+            </a:extLst>
+          </p:cNvPr>
+          <p:cNvSpPr txBox="1"/>
+          <p:nvPr/>
+        </p:nvSpPr>
+        <p:spPr>
+          <a:xfrm>
+            <a:off x="1422400" y="1327573"/>
+            <a:ext cx="8466667" cy="923330"/>
+          </a:xfrm>
+          <a:prstGeom prst="rect">
+            <a:avLst/>
+          </a:prstGeom>
+          <a:noFill/>
+        </p:spPr>
+        <p:txBody>
+          <a:bodyPr wrap="square" rtlCol="0">
+            <a:spAutoFit/>
+          </a:bodyPr>
+          <a:lstStyle/>
+          <a:p>
+            <a:pPr marL="342900" indent="-342900">
+              <a:buAutoNum type="arabicPeriod"/>
+            </a:pPr>
+            <a:r>
+              <a:rPr lang="zh-CN" altLang="en-US" dirty="0"/>
+              <a:t>为什么样例中第二阶段</a:t>
+            </a:r>
+            <a:r>
+              <a:rPr lang="en-US" altLang="zh-CN" dirty="0" err="1"/>
+              <a:t>FoR</a:t>
+            </a:r>
+            <a:r>
+              <a:rPr lang="zh-CN" altLang="en-US" dirty="0"/>
+              <a:t>压缩方案的表达式展开过程，子表达式是</a:t>
+            </a:r>
+            <a:r>
+              <a:rPr lang="en-US" altLang="zh-CN" dirty="0" err="1"/>
+              <a:t>a+Min</a:t>
+            </a:r>
+            <a:r>
+              <a:rPr lang="en-US" altLang="zh-CN" dirty="0"/>
+              <a:t>()</a:t>
+            </a:r>
+          </a:p>
+          <a:p>
+            <a:r>
+              <a:rPr lang="en-US" altLang="zh-CN" dirty="0"/>
+              <a:t>      </a:t>
+            </a:r>
+            <a:r>
+              <a:rPr lang="zh-CN" altLang="en-US" dirty="0"/>
+              <a:t>我的理解是</a:t>
+            </a:r>
+            <a:r>
+              <a:rPr lang="en-US" altLang="zh-CN" dirty="0" err="1"/>
+              <a:t>FoR</a:t>
+            </a:r>
+            <a:r>
+              <a:rPr lang="zh-CN" altLang="en-US" dirty="0"/>
+              <a:t>方案中，每个</a:t>
+            </a:r>
+            <a:r>
+              <a:rPr lang="en-US" altLang="zh-CN" dirty="0"/>
+              <a:t>Block</a:t>
+            </a:r>
+            <a:r>
+              <a:rPr lang="zh-CN" altLang="en-US" dirty="0"/>
+              <a:t>存储</a:t>
+            </a:r>
+            <a:r>
+              <a:rPr lang="en-US" altLang="zh-CN" dirty="0"/>
+              <a:t>delta</a:t>
+            </a:r>
+            <a:r>
+              <a:rPr lang="zh-CN" altLang="en-US" dirty="0"/>
+              <a:t>和当前块的最小值</a:t>
+            </a:r>
+            <a:endParaRPr lang="en-US" altLang="zh-CN" dirty="0"/>
+          </a:p>
+          <a:p>
+            <a:r>
+              <a:rPr lang="en-US" altLang="zh-CN" dirty="0"/>
+              <a:t>      CastToInt64()</a:t>
+            </a:r>
+            <a:r>
+              <a:rPr lang="zh-CN" altLang="en-US" dirty="0"/>
+              <a:t>不知道是干啥的</a:t>
+            </a:r>
+            <a:endParaRPr lang="en-US" altLang="zh-CN" dirty="0"/>
+          </a:p>
+        </p:txBody>
+      </p:sp>
+    </p:spTree>
+    <p:extLst>
+      <p:ext uri="{BB962C8B-B14F-4D97-AF65-F5344CB8AC3E}">
+        <p14:creationId xmlns:p14="http://schemas.microsoft.com/office/powerpoint/2010/main" val="862410573"/>
+      </p:ext>
+    </p:extLst>
+  </p:cSld>
+  <p:clrMapOvr>
+    <a:masterClrMapping/>
+  </p:clrMapOvr>
+</p:sld>
+</file>
+
+<file path=ppt/slides/slide8.xml><?xml version="1.0" encoding="utf-8"?>
 <p:sld xmlns:a="http://schemas.openxmlformats.org/drawingml/2006/main" xmlns:r="http://schemas.openxmlformats.org/officeDocument/2006/relationships" xmlns:p="http://schemas.openxmlformats.org/presentationml/2006/main">
   <p:cSld>
     <p:spTree>

</xml_diff>